<commit_message>
Create 스프링부트 CRUD REST API
</commit_message>
<xml_diff>
--- a/Article/Note/일년차_보내며_뒤돌아본_공백기/img/img.pptx
+++ b/Article/Note/일년차_보내며_뒤돌아본_공백기/img/img.pptx
@@ -6,6 +6,9 @@
   </p:sldMasterIdLst>
   <p:sldIdLst>
     <p:sldId id="256" r:id="rId2"/>
+    <p:sldId id="257" r:id="rId3"/>
+    <p:sldId id="258" r:id="rId4"/>
+    <p:sldId id="259" r:id="rId5"/>
   </p:sldIdLst>
   <p:sldSz cx="12192000" cy="6858000"/>
   <p:notesSz cx="6858000" cy="9144000"/>
@@ -3337,10 +3340,659 @@
           <a:chExt cx="0" cy="0"/>
         </a:xfrm>
       </p:grpSpPr>
+      <p:pic>
+        <p:nvPicPr>
+          <p:cNvPr id="5" name="그림 4">
+            <a:extLst>
+              <a:ext uri="{FF2B5EF4-FFF2-40B4-BE49-F238E27FC236}">
+                <a16:creationId xmlns:a16="http://schemas.microsoft.com/office/drawing/2014/main" id="{3EC03FE0-B8D1-3046-AA26-73BC775CF1EE}"/>
+              </a:ext>
+            </a:extLst>
+          </p:cNvPr>
+          <p:cNvPicPr>
+            <a:picLocks noChangeAspect="1"/>
+          </p:cNvPicPr>
+          <p:nvPr/>
+        </p:nvPicPr>
+        <p:blipFill rotWithShape="1">
+          <a:blip r:embed="rId2"/>
+          <a:srcRect l="1203" r="307"/>
+          <a:stretch/>
+        </p:blipFill>
+        <p:spPr>
+          <a:xfrm>
+            <a:off x="2506290" y="639684"/>
+            <a:ext cx="7775316" cy="2789316"/>
+          </a:xfrm>
+          <a:prstGeom prst="rect">
+            <a:avLst/>
+          </a:prstGeom>
+        </p:spPr>
+      </p:pic>
+      <p:pic>
+        <p:nvPicPr>
+          <p:cNvPr id="7" name="그림 6" descr="텍스트이(가) 표시된 사진&#10;&#10;자동 생성된 설명">
+            <a:extLst>
+              <a:ext uri="{FF2B5EF4-FFF2-40B4-BE49-F238E27FC236}">
+                <a16:creationId xmlns:a16="http://schemas.microsoft.com/office/drawing/2014/main" id="{6F2058B9-A0F1-E446-98C0-E383053739E2}"/>
+              </a:ext>
+            </a:extLst>
+          </p:cNvPr>
+          <p:cNvPicPr>
+            <a:picLocks noChangeAspect="1"/>
+          </p:cNvPicPr>
+          <p:nvPr/>
+        </p:nvPicPr>
+        <p:blipFill>
+          <a:blip r:embed="rId3"/>
+          <a:stretch>
+            <a:fillRect/>
+          </a:stretch>
+        </p:blipFill>
+        <p:spPr>
+          <a:xfrm>
+            <a:off x="2506290" y="3183065"/>
+            <a:ext cx="7762558" cy="1140471"/>
+          </a:xfrm>
+          <a:prstGeom prst="rect">
+            <a:avLst/>
+          </a:prstGeom>
+        </p:spPr>
+      </p:pic>
+      <p:pic>
+        <p:nvPicPr>
+          <p:cNvPr id="9" name="그림 8">
+            <a:extLst>
+              <a:ext uri="{FF2B5EF4-FFF2-40B4-BE49-F238E27FC236}">
+                <a16:creationId xmlns:a16="http://schemas.microsoft.com/office/drawing/2014/main" id="{8651AFF1-BD6F-C348-A43E-8BA52D8969A8}"/>
+              </a:ext>
+            </a:extLst>
+          </p:cNvPr>
+          <p:cNvPicPr>
+            <a:picLocks noChangeAspect="1"/>
+          </p:cNvPicPr>
+          <p:nvPr/>
+        </p:nvPicPr>
+        <p:blipFill>
+          <a:blip r:embed="rId4"/>
+          <a:stretch>
+            <a:fillRect/>
+          </a:stretch>
+        </p:blipFill>
+        <p:spPr>
+          <a:xfrm>
+            <a:off x="2506289" y="4323536"/>
+            <a:ext cx="7738468" cy="958096"/>
+          </a:xfrm>
+          <a:prstGeom prst="rect">
+            <a:avLst/>
+          </a:prstGeom>
+        </p:spPr>
+      </p:pic>
+      <p:pic>
+        <p:nvPicPr>
+          <p:cNvPr id="11" name="그림 10">
+            <a:extLst>
+              <a:ext uri="{FF2B5EF4-FFF2-40B4-BE49-F238E27FC236}">
+                <a16:creationId xmlns:a16="http://schemas.microsoft.com/office/drawing/2014/main" id="{D1E27159-2F51-694C-B64C-B1BD1465607B}"/>
+              </a:ext>
+            </a:extLst>
+          </p:cNvPr>
+          <p:cNvPicPr>
+            <a:picLocks noChangeAspect="1"/>
+          </p:cNvPicPr>
+          <p:nvPr/>
+        </p:nvPicPr>
+        <p:blipFill>
+          <a:blip r:embed="rId5"/>
+          <a:stretch>
+            <a:fillRect/>
+          </a:stretch>
+        </p:blipFill>
+        <p:spPr>
+          <a:xfrm>
+            <a:off x="2506288" y="5218072"/>
+            <a:ext cx="7775318" cy="958096"/>
+          </a:xfrm>
+          <a:prstGeom prst="rect">
+            <a:avLst/>
+          </a:prstGeom>
+        </p:spPr>
+      </p:pic>
+      <p:sp>
+        <p:nvSpPr>
+          <p:cNvPr id="12" name="직사각형 11">
+            <a:extLst>
+              <a:ext uri="{FF2B5EF4-FFF2-40B4-BE49-F238E27FC236}">
+                <a16:creationId xmlns:a16="http://schemas.microsoft.com/office/drawing/2014/main" id="{7FCEA3B8-8F1D-E14F-92F6-3BB2EF6B4A0D}"/>
+              </a:ext>
+            </a:extLst>
+          </p:cNvPr>
+          <p:cNvSpPr/>
+          <p:nvPr/>
+        </p:nvSpPr>
+        <p:spPr>
+          <a:xfrm>
+            <a:off x="2506288" y="660758"/>
+            <a:ext cx="7738467" cy="5536484"/>
+          </a:xfrm>
+          <a:prstGeom prst="rect">
+            <a:avLst/>
+          </a:prstGeom>
+          <a:noFill/>
+          <a:ln>
+            <a:solidFill>
+              <a:schemeClr val="accent1">
+                <a:shade val="50000"/>
+              </a:schemeClr>
+            </a:solidFill>
+          </a:ln>
+        </p:spPr>
+        <p:style>
+          <a:lnRef idx="2">
+            <a:schemeClr val="accent1">
+              <a:shade val="50000"/>
+            </a:schemeClr>
+          </a:lnRef>
+          <a:fillRef idx="1">
+            <a:schemeClr val="accent1"/>
+          </a:fillRef>
+          <a:effectRef idx="0">
+            <a:schemeClr val="accent1"/>
+          </a:effectRef>
+          <a:fontRef idx="minor">
+            <a:schemeClr val="lt1"/>
+          </a:fontRef>
+        </p:style>
+        <p:txBody>
+          <a:bodyPr rtlCol="0" anchor="ctr"/>
+          <a:lstStyle/>
+          <a:p>
+            <a:pPr algn="ctr"/>
+            <a:endParaRPr kumimoji="1" lang="ko-KR" altLang="en-US"/>
+          </a:p>
+        </p:txBody>
+      </p:sp>
     </p:spTree>
     <p:extLst>
       <p:ext uri="{BB962C8B-B14F-4D97-AF65-F5344CB8AC3E}">
         <p14:creationId xmlns:p14="http://schemas.microsoft.com/office/powerpoint/2010/main" val="3265090293"/>
+      </p:ext>
+    </p:extLst>
+  </p:cSld>
+  <p:clrMapOvr>
+    <a:masterClrMapping/>
+  </p:clrMapOvr>
+</p:sld>
+</file>
+
+<file path=ppt/slides/slide2.xml><?xml version="1.0" encoding="utf-8"?>
+<p:sld xmlns:a="http://schemas.openxmlformats.org/drawingml/2006/main" xmlns:r="http://schemas.openxmlformats.org/officeDocument/2006/relationships" xmlns:p="http://schemas.openxmlformats.org/presentationml/2006/main">
+  <p:cSld>
+    <p:bg>
+      <p:bgPr>
+        <a:solidFill>
+          <a:srgbClr val="0B0B0C"/>
+        </a:solidFill>
+        <a:effectLst/>
+      </p:bgPr>
+    </p:bg>
+    <p:spTree>
+      <p:nvGrpSpPr>
+        <p:cNvPr id="1" name=""/>
+        <p:cNvGrpSpPr/>
+        <p:nvPr/>
+      </p:nvGrpSpPr>
+      <p:grpSpPr>
+        <a:xfrm>
+          <a:off x="0" y="0"/>
+          <a:ext cx="0" cy="0"/>
+          <a:chOff x="0" y="0"/>
+          <a:chExt cx="0" cy="0"/>
+        </a:xfrm>
+      </p:grpSpPr>
+      <p:pic>
+        <p:nvPicPr>
+          <p:cNvPr id="5" name="그림 4" descr="텍스트, 창문, 실내이(가) 표시된 사진&#10;&#10;자동 생성된 설명">
+            <a:extLst>
+              <a:ext uri="{FF2B5EF4-FFF2-40B4-BE49-F238E27FC236}">
+                <a16:creationId xmlns:a16="http://schemas.microsoft.com/office/drawing/2014/main" id="{5FEB25E4-37F6-7A47-8474-24CA570B47E4}"/>
+              </a:ext>
+            </a:extLst>
+          </p:cNvPr>
+          <p:cNvPicPr>
+            <a:picLocks noChangeAspect="1"/>
+          </p:cNvPicPr>
+          <p:nvPr/>
+        </p:nvPicPr>
+        <p:blipFill>
+          <a:blip r:embed="rId2"/>
+          <a:stretch>
+            <a:fillRect/>
+          </a:stretch>
+        </p:blipFill>
+        <p:spPr>
+          <a:xfrm>
+            <a:off x="3500742" y="0"/>
+            <a:ext cx="5190516" cy="6858000"/>
+          </a:xfrm>
+          <a:prstGeom prst="rect">
+            <a:avLst/>
+          </a:prstGeom>
+        </p:spPr>
+      </p:pic>
+    </p:spTree>
+    <p:extLst>
+      <p:ext uri="{BB962C8B-B14F-4D97-AF65-F5344CB8AC3E}">
+        <p14:creationId xmlns:p14="http://schemas.microsoft.com/office/powerpoint/2010/main" val="982417153"/>
+      </p:ext>
+    </p:extLst>
+  </p:cSld>
+  <p:clrMapOvr>
+    <a:masterClrMapping/>
+  </p:clrMapOvr>
+</p:sld>
+</file>
+
+<file path=ppt/slides/slide3.xml><?xml version="1.0" encoding="utf-8"?>
+<p:sld xmlns:a="http://schemas.openxmlformats.org/drawingml/2006/main" xmlns:r="http://schemas.openxmlformats.org/officeDocument/2006/relationships" xmlns:p="http://schemas.openxmlformats.org/presentationml/2006/main">
+  <p:cSld>
+    <p:spTree>
+      <p:nvGrpSpPr>
+        <p:cNvPr id="1" name=""/>
+        <p:cNvGrpSpPr/>
+        <p:nvPr/>
+      </p:nvGrpSpPr>
+      <p:grpSpPr>
+        <a:xfrm>
+          <a:off x="0" y="0"/>
+          <a:ext cx="0" cy="0"/>
+          <a:chOff x="0" y="0"/>
+          <a:chExt cx="0" cy="0"/>
+        </a:xfrm>
+      </p:grpSpPr>
+      <p:pic>
+        <p:nvPicPr>
+          <p:cNvPr id="7" name="그림 6" descr="텍스트, 사람, 실내, 기기이(가) 표시된 사진&#10;&#10;자동 생성된 설명">
+            <a:extLst>
+              <a:ext uri="{FF2B5EF4-FFF2-40B4-BE49-F238E27FC236}">
+                <a16:creationId xmlns:a16="http://schemas.microsoft.com/office/drawing/2014/main" id="{CA076014-8CB2-6542-8047-437E4D736619}"/>
+              </a:ext>
+            </a:extLst>
+          </p:cNvPr>
+          <p:cNvPicPr>
+            <a:picLocks noChangeAspect="1"/>
+          </p:cNvPicPr>
+          <p:nvPr/>
+        </p:nvPicPr>
+        <p:blipFill rotWithShape="1">
+          <a:blip r:embed="rId2"/>
+          <a:srcRect t="14680" r="-1922" b="5589"/>
+          <a:stretch/>
+        </p:blipFill>
+        <p:spPr>
+          <a:xfrm>
+            <a:off x="856226" y="840509"/>
+            <a:ext cx="5239774" cy="5467927"/>
+          </a:xfrm>
+          <a:prstGeom prst="rect">
+            <a:avLst/>
+          </a:prstGeom>
+        </p:spPr>
+      </p:pic>
+      <p:sp>
+        <p:nvSpPr>
+          <p:cNvPr id="9" name="직사각형 8">
+            <a:extLst>
+              <a:ext uri="{FF2B5EF4-FFF2-40B4-BE49-F238E27FC236}">
+                <a16:creationId xmlns:a16="http://schemas.microsoft.com/office/drawing/2014/main" id="{AAFCD171-2278-A84A-89F7-166C69FD5A91}"/>
+              </a:ext>
+            </a:extLst>
+          </p:cNvPr>
+          <p:cNvSpPr/>
+          <p:nvPr/>
+        </p:nvSpPr>
+        <p:spPr>
+          <a:xfrm>
+            <a:off x="6096000" y="2604654"/>
+            <a:ext cx="526473" cy="461818"/>
+          </a:xfrm>
+          <a:prstGeom prst="rect">
+            <a:avLst/>
+          </a:prstGeom>
+          <a:solidFill>
+            <a:schemeClr val="bg1"/>
+          </a:solidFill>
+          <a:ln>
+            <a:noFill/>
+          </a:ln>
+        </p:spPr>
+        <p:style>
+          <a:lnRef idx="2">
+            <a:schemeClr val="accent1">
+              <a:shade val="50000"/>
+            </a:schemeClr>
+          </a:lnRef>
+          <a:fillRef idx="1">
+            <a:schemeClr val="accent1"/>
+          </a:fillRef>
+          <a:effectRef idx="0">
+            <a:schemeClr val="accent1"/>
+          </a:effectRef>
+          <a:fontRef idx="minor">
+            <a:schemeClr val="lt1"/>
+          </a:fontRef>
+        </p:style>
+        <p:txBody>
+          <a:bodyPr rtlCol="0" anchor="ctr"/>
+          <a:lstStyle/>
+          <a:p>
+            <a:pPr algn="ctr"/>
+            <a:endParaRPr kumimoji="1" lang="ko-KR" altLang="en-US"/>
+          </a:p>
+        </p:txBody>
+      </p:sp>
+      <p:sp>
+        <p:nvSpPr>
+          <p:cNvPr id="10" name="직사각형 9">
+            <a:extLst>
+              <a:ext uri="{FF2B5EF4-FFF2-40B4-BE49-F238E27FC236}">
+                <a16:creationId xmlns:a16="http://schemas.microsoft.com/office/drawing/2014/main" id="{768F71D6-A867-6B4D-A2C7-3F6A447F1D9C}"/>
+              </a:ext>
+            </a:extLst>
+          </p:cNvPr>
+          <p:cNvSpPr/>
+          <p:nvPr/>
+        </p:nvSpPr>
+        <p:spPr>
+          <a:xfrm>
+            <a:off x="8843818" y="5163127"/>
+            <a:ext cx="526473" cy="461818"/>
+          </a:xfrm>
+          <a:prstGeom prst="rect">
+            <a:avLst/>
+          </a:prstGeom>
+          <a:solidFill>
+            <a:schemeClr val="bg1"/>
+          </a:solidFill>
+          <a:ln>
+            <a:noFill/>
+          </a:ln>
+        </p:spPr>
+        <p:style>
+          <a:lnRef idx="2">
+            <a:schemeClr val="accent1">
+              <a:shade val="50000"/>
+            </a:schemeClr>
+          </a:lnRef>
+          <a:fillRef idx="1">
+            <a:schemeClr val="accent1"/>
+          </a:fillRef>
+          <a:effectRef idx="0">
+            <a:schemeClr val="accent1"/>
+          </a:effectRef>
+          <a:fontRef idx="minor">
+            <a:schemeClr val="lt1"/>
+          </a:fontRef>
+        </p:style>
+        <p:txBody>
+          <a:bodyPr rtlCol="0" anchor="ctr"/>
+          <a:lstStyle/>
+          <a:p>
+            <a:pPr algn="ctr"/>
+            <a:endParaRPr kumimoji="1" lang="ko-KR" altLang="en-US"/>
+          </a:p>
+        </p:txBody>
+      </p:sp>
+      <p:pic>
+        <p:nvPicPr>
+          <p:cNvPr id="12" name="그림 11" descr="텍스트이(가) 표시된 사진&#10;&#10;자동 생성된 설명">
+            <a:extLst>
+              <a:ext uri="{FF2B5EF4-FFF2-40B4-BE49-F238E27FC236}">
+                <a16:creationId xmlns:a16="http://schemas.microsoft.com/office/drawing/2014/main" id="{49DBF5A3-0E02-CC40-869D-897B0F8A9116}"/>
+              </a:ext>
+            </a:extLst>
+          </p:cNvPr>
+          <p:cNvPicPr>
+            <a:picLocks noChangeAspect="1"/>
+          </p:cNvPicPr>
+          <p:nvPr/>
+        </p:nvPicPr>
+        <p:blipFill>
+          <a:blip r:embed="rId3"/>
+          <a:stretch>
+            <a:fillRect/>
+          </a:stretch>
+        </p:blipFill>
+        <p:spPr>
+          <a:xfrm>
+            <a:off x="5984651" y="1805710"/>
+            <a:ext cx="5819422" cy="3273425"/>
+          </a:xfrm>
+          <a:prstGeom prst="rect">
+            <a:avLst/>
+          </a:prstGeom>
+        </p:spPr>
+      </p:pic>
+      <p:sp>
+        <p:nvSpPr>
+          <p:cNvPr id="13" name="직사각형 12">
+            <a:extLst>
+              <a:ext uri="{FF2B5EF4-FFF2-40B4-BE49-F238E27FC236}">
+                <a16:creationId xmlns:a16="http://schemas.microsoft.com/office/drawing/2014/main" id="{837E9501-899C-9A4E-82F4-81DCCF173B8E}"/>
+              </a:ext>
+            </a:extLst>
+          </p:cNvPr>
+          <p:cNvSpPr/>
+          <p:nvPr/>
+        </p:nvSpPr>
+        <p:spPr>
+          <a:xfrm flipV="1">
+            <a:off x="5984651" y="4876799"/>
+            <a:ext cx="5819422" cy="45719"/>
+          </a:xfrm>
+          <a:prstGeom prst="rect">
+            <a:avLst/>
+          </a:prstGeom>
+          <a:solidFill>
+            <a:srgbClr val="FF0000"/>
+          </a:solidFill>
+          <a:ln>
+            <a:noFill/>
+          </a:ln>
+        </p:spPr>
+        <p:style>
+          <a:lnRef idx="2">
+            <a:schemeClr val="accent1">
+              <a:shade val="50000"/>
+            </a:schemeClr>
+          </a:lnRef>
+          <a:fillRef idx="1">
+            <a:schemeClr val="accent1"/>
+          </a:fillRef>
+          <a:effectRef idx="0">
+            <a:schemeClr val="accent1"/>
+          </a:effectRef>
+          <a:fontRef idx="minor">
+            <a:schemeClr val="lt1"/>
+          </a:fontRef>
+        </p:style>
+        <p:txBody>
+          <a:bodyPr rtlCol="0" anchor="ctr"/>
+          <a:lstStyle/>
+          <a:p>
+            <a:pPr algn="ctr"/>
+            <a:endParaRPr kumimoji="1" lang="ko-KR" altLang="en-US"/>
+          </a:p>
+        </p:txBody>
+      </p:sp>
+      <p:sp>
+        <p:nvSpPr>
+          <p:cNvPr id="14" name="직사각형 13">
+            <a:extLst>
+              <a:ext uri="{FF2B5EF4-FFF2-40B4-BE49-F238E27FC236}">
+                <a16:creationId xmlns:a16="http://schemas.microsoft.com/office/drawing/2014/main" id="{B3FA4B7F-9688-5541-A255-42B23A11A4E4}"/>
+              </a:ext>
+            </a:extLst>
+          </p:cNvPr>
+          <p:cNvSpPr/>
+          <p:nvPr/>
+        </p:nvSpPr>
+        <p:spPr>
+          <a:xfrm flipV="1">
+            <a:off x="5989527" y="1851429"/>
+            <a:ext cx="5814546" cy="111299"/>
+          </a:xfrm>
+          <a:prstGeom prst="rect">
+            <a:avLst/>
+          </a:prstGeom>
+          <a:solidFill>
+            <a:srgbClr val="676767"/>
+          </a:solidFill>
+          <a:ln>
+            <a:noFill/>
+          </a:ln>
+        </p:spPr>
+        <p:style>
+          <a:lnRef idx="2">
+            <a:schemeClr val="accent1">
+              <a:shade val="50000"/>
+            </a:schemeClr>
+          </a:lnRef>
+          <a:fillRef idx="1">
+            <a:schemeClr val="accent1"/>
+          </a:fillRef>
+          <a:effectRef idx="0">
+            <a:schemeClr val="accent1"/>
+          </a:effectRef>
+          <a:fontRef idx="minor">
+            <a:schemeClr val="lt1"/>
+          </a:fontRef>
+        </p:style>
+        <p:txBody>
+          <a:bodyPr rtlCol="0" anchor="ctr"/>
+          <a:lstStyle/>
+          <a:p>
+            <a:pPr algn="ctr"/>
+            <a:endParaRPr kumimoji="1" lang="ko-KR" altLang="en-US"/>
+          </a:p>
+        </p:txBody>
+      </p:sp>
+      <p:sp>
+        <p:nvSpPr>
+          <p:cNvPr id="15" name="직사각형 14">
+            <a:extLst>
+              <a:ext uri="{FF2B5EF4-FFF2-40B4-BE49-F238E27FC236}">
+                <a16:creationId xmlns:a16="http://schemas.microsoft.com/office/drawing/2014/main" id="{7CD8098C-65C0-4A45-BA06-FF5E48029B0C}"/>
+              </a:ext>
+            </a:extLst>
+          </p:cNvPr>
+          <p:cNvSpPr/>
+          <p:nvPr/>
+        </p:nvSpPr>
+        <p:spPr>
+          <a:xfrm flipV="1">
+            <a:off x="6599125" y="4977997"/>
+            <a:ext cx="503637" cy="45719"/>
+          </a:xfrm>
+          <a:prstGeom prst="rect">
+            <a:avLst/>
+          </a:prstGeom>
+          <a:solidFill>
+            <a:srgbClr val="676767"/>
+          </a:solidFill>
+          <a:ln>
+            <a:noFill/>
+          </a:ln>
+        </p:spPr>
+        <p:style>
+          <a:lnRef idx="2">
+            <a:schemeClr val="accent1">
+              <a:shade val="50000"/>
+            </a:schemeClr>
+          </a:lnRef>
+          <a:fillRef idx="1">
+            <a:schemeClr val="accent1"/>
+          </a:fillRef>
+          <a:effectRef idx="0">
+            <a:schemeClr val="accent1"/>
+          </a:effectRef>
+          <a:fontRef idx="minor">
+            <a:schemeClr val="lt1"/>
+          </a:fontRef>
+        </p:style>
+        <p:txBody>
+          <a:bodyPr rtlCol="0" anchor="ctr"/>
+          <a:lstStyle/>
+          <a:p>
+            <a:pPr algn="ctr"/>
+            <a:endParaRPr kumimoji="1" lang="ko-KR" altLang="en-US"/>
+          </a:p>
+        </p:txBody>
+      </p:sp>
+    </p:spTree>
+    <p:extLst>
+      <p:ext uri="{BB962C8B-B14F-4D97-AF65-F5344CB8AC3E}">
+        <p14:creationId xmlns:p14="http://schemas.microsoft.com/office/powerpoint/2010/main" val="3033445167"/>
+      </p:ext>
+    </p:extLst>
+  </p:cSld>
+  <p:clrMapOvr>
+    <a:masterClrMapping/>
+  </p:clrMapOvr>
+</p:sld>
+</file>
+
+<file path=ppt/slides/slide4.xml><?xml version="1.0" encoding="utf-8"?>
+<p:sld xmlns:a="http://schemas.openxmlformats.org/drawingml/2006/main" xmlns:r="http://schemas.openxmlformats.org/officeDocument/2006/relationships" xmlns:p="http://schemas.openxmlformats.org/presentationml/2006/main">
+  <p:cSld>
+    <p:spTree>
+      <p:nvGrpSpPr>
+        <p:cNvPr id="1" name=""/>
+        <p:cNvGrpSpPr/>
+        <p:nvPr/>
+      </p:nvGrpSpPr>
+      <p:grpSpPr>
+        <a:xfrm>
+          <a:off x="0" y="0"/>
+          <a:ext cx="0" cy="0"/>
+          <a:chOff x="0" y="0"/>
+          <a:chExt cx="0" cy="0"/>
+        </a:xfrm>
+      </p:grpSpPr>
+      <p:pic>
+        <p:nvPicPr>
+          <p:cNvPr id="4" name="그림 3">
+            <a:extLst>
+              <a:ext uri="{FF2B5EF4-FFF2-40B4-BE49-F238E27FC236}">
+                <a16:creationId xmlns:a16="http://schemas.microsoft.com/office/drawing/2014/main" id="{0F49A1A5-852F-614D-A9C0-2A5C078BA86C}"/>
+              </a:ext>
+            </a:extLst>
+          </p:cNvPr>
+          <p:cNvPicPr>
+            <a:picLocks noChangeAspect="1"/>
+          </p:cNvPicPr>
+          <p:nvPr/>
+        </p:nvPicPr>
+        <p:blipFill rotWithShape="1">
+          <a:blip r:embed="rId2"/>
+          <a:srcRect t="3097"/>
+          <a:stretch/>
+        </p:blipFill>
+        <p:spPr>
+          <a:xfrm>
+            <a:off x="9236" y="212436"/>
+            <a:ext cx="12192000" cy="6645564"/>
+          </a:xfrm>
+          <a:prstGeom prst="rect">
+            <a:avLst/>
+          </a:prstGeom>
+        </p:spPr>
+      </p:pic>
+    </p:spTree>
+    <p:extLst>
+      <p:ext uri="{BB962C8B-B14F-4D97-AF65-F5344CB8AC3E}">
+        <p14:creationId xmlns:p14="http://schemas.microsoft.com/office/powerpoint/2010/main" val="674348306"/>
       </p:ext>
     </p:extLst>
   </p:cSld>

</xml_diff>